<commit_message>
add gui and struct diagram.
</commit_message>
<xml_diff>
--- a/Documents/G7-a0_landscape-projectposter-Arthur.pptx
+++ b/Documents/G7-a0_landscape-projectposter-Arthur.pptx
@@ -6,6 +6,7 @@
   </p:sldMasterIdLst>
   <p:sldIdLst>
     <p:sldId id="256" r:id="rId2"/>
+    <p:sldId id="257" r:id="rId3"/>
   </p:sldIdLst>
   <p:sldSz cx="42803763" cy="30275213"/>
   <p:notesSz cx="7772400" cy="10058400"/>
@@ -6818,6 +6819,163 @@
 </p:sld>
 </file>
 
+<file path=ppt/slides/slide2.xml><?xml version="1.0" encoding="utf-8"?>
+<p:sld xmlns:a="http://schemas.openxmlformats.org/drawingml/2006/main" xmlns:r="http://schemas.openxmlformats.org/officeDocument/2006/relationships" xmlns:p="http://schemas.openxmlformats.org/presentationml/2006/main">
+  <p:cSld>
+    <p:spTree>
+      <p:nvGrpSpPr>
+        <p:cNvPr id="1" name=""/>
+        <p:cNvGrpSpPr/>
+        <p:nvPr/>
+      </p:nvGrpSpPr>
+      <p:grpSpPr>
+        <a:xfrm>
+          <a:off x="0" y="0"/>
+          <a:ext cx="0" cy="0"/>
+          <a:chOff x="0" y="0"/>
+          <a:chExt cx="0" cy="0"/>
+        </a:xfrm>
+      </p:grpSpPr>
+      <p:sp>
+        <p:nvSpPr>
+          <p:cNvPr id="2" name="Title 1">
+            <a:extLst>
+              <a:ext uri="{FF2B5EF4-FFF2-40B4-BE49-F238E27FC236}">
+                <a16:creationId xmlns:a16="http://schemas.microsoft.com/office/drawing/2014/main" id="{70D62AFA-096D-32BB-A702-F57828122A92}"/>
+              </a:ext>
+            </a:extLst>
+          </p:cNvPr>
+          <p:cNvSpPr>
+            <a:spLocks noGrp="1"/>
+          </p:cNvSpPr>
+          <p:nvPr>
+            <p:ph type="title"/>
+          </p:nvPr>
+        </p:nvSpPr>
+        <p:spPr/>
+        <p:txBody>
+          <a:bodyPr/>
+          <a:lstStyle/>
+          <a:p>
+            <a:endParaRPr lang="en-CA"/>
+          </a:p>
+        </p:txBody>
+      </p:sp>
+      <p:sp>
+        <p:nvSpPr>
+          <p:cNvPr id="3" name="Subtitle 2">
+            <a:extLst>
+              <a:ext uri="{FF2B5EF4-FFF2-40B4-BE49-F238E27FC236}">
+                <a16:creationId xmlns:a16="http://schemas.microsoft.com/office/drawing/2014/main" id="{798DBB3C-A6EB-F9F4-4C7E-7ECAFCD8250D}"/>
+              </a:ext>
+            </a:extLst>
+          </p:cNvPr>
+          <p:cNvSpPr>
+            <a:spLocks noGrp="1"/>
+          </p:cNvSpPr>
+          <p:nvPr>
+            <p:ph type="subTitle"/>
+          </p:nvPr>
+        </p:nvSpPr>
+        <p:spPr/>
+        <p:txBody>
+          <a:bodyPr/>
+          <a:lstStyle/>
+          <a:p>
+            <a:endParaRPr lang="en-CA" dirty="0"/>
+          </a:p>
+        </p:txBody>
+      </p:sp>
+      <p:pic>
+        <p:nvPicPr>
+          <p:cNvPr id="5" name="Picture 4">
+            <a:extLst>
+              <a:ext uri="{FF2B5EF4-FFF2-40B4-BE49-F238E27FC236}">
+                <a16:creationId xmlns:a16="http://schemas.microsoft.com/office/drawing/2014/main" id="{CA6DAF9D-ACC8-3867-377A-F73E4DE5C825}"/>
+              </a:ext>
+            </a:extLst>
+          </p:cNvPr>
+          <p:cNvPicPr>
+            <a:picLocks noChangeAspect="1"/>
+          </p:cNvPicPr>
+          <p:nvPr/>
+        </p:nvPicPr>
+        <p:blipFill>
+          <a:blip r:embed="rId2"/>
+          <a:stretch>
+            <a:fillRect/>
+          </a:stretch>
+        </p:blipFill>
+        <p:spPr>
+          <a:xfrm>
+            <a:off x="3922172" y="8545397"/>
+            <a:ext cx="16981790" cy="11414647"/>
+          </a:xfrm>
+          <a:prstGeom prst="rect">
+            <a:avLst/>
+          </a:prstGeom>
+        </p:spPr>
+      </p:pic>
+      <p:pic>
+        <p:nvPicPr>
+          <p:cNvPr id="1026" name="Picture 2">
+            <a:extLst>
+              <a:ext uri="{FF2B5EF4-FFF2-40B4-BE49-F238E27FC236}">
+                <a16:creationId xmlns:a16="http://schemas.microsoft.com/office/drawing/2014/main" id="{57334A7B-B646-A3A6-9436-8CAA2D281D6F}"/>
+              </a:ext>
+            </a:extLst>
+          </p:cNvPr>
+          <p:cNvPicPr>
+            <a:picLocks noChangeAspect="1" noChangeArrowheads="1"/>
+          </p:cNvPicPr>
+          <p:nvPr/>
+        </p:nvPicPr>
+        <p:blipFill>
+          <a:blip r:embed="rId3">
+            <a:extLst>
+              <a:ext uri="{28A0092B-C50C-407E-A947-70E740481C1C}">
+                <a14:useLocalDpi xmlns:a14="http://schemas.microsoft.com/office/drawing/2010/main" val="0"/>
+              </a:ext>
+            </a:extLst>
+          </a:blip>
+          <a:srcRect/>
+          <a:stretch>
+            <a:fillRect/>
+          </a:stretch>
+        </p:blipFill>
+        <p:spPr bwMode="auto">
+          <a:xfrm>
+            <a:off x="22300187" y="8878593"/>
+            <a:ext cx="15650171" cy="11977509"/>
+          </a:xfrm>
+          <a:prstGeom prst="rect">
+            <a:avLst/>
+          </a:prstGeom>
+          <a:noFill/>
+          <a:extLst>
+            <a:ext uri="{909E8E84-426E-40DD-AFC4-6F175D3DCCD1}">
+              <a14:hiddenFill xmlns:a14="http://schemas.microsoft.com/office/drawing/2010/main">
+                <a:solidFill>
+                  <a:srgbClr val="FFFFFF"/>
+                </a:solidFill>
+              </a14:hiddenFill>
+            </a:ext>
+          </a:extLst>
+        </p:spPr>
+      </p:pic>
+    </p:spTree>
+    <p:extLst>
+      <p:ext uri="{BB962C8B-B14F-4D97-AF65-F5344CB8AC3E}">
+        <p14:creationId xmlns:p14="http://schemas.microsoft.com/office/powerpoint/2010/main" val="2386124200"/>
+      </p:ext>
+    </p:extLst>
+  </p:cSld>
+  <p:clrMapOvr>
+    <a:masterClrMapping/>
+  </p:clrMapOvr>
+</p:sld>
+</file>
+
 <file path=ppt/theme/theme1.xml><?xml version="1.0" encoding="utf-8"?>
 <a:theme xmlns:a="http://schemas.openxmlformats.org/drawingml/2006/main" name="Science Poster">
   <a:themeElements>

</xml_diff>